<commit_message>
adicionando css aula 01
</commit_message>
<xml_diff>
--- a/Introdução à Programação/projeto_final/conceito/ideias.pptx
+++ b/Introdução à Programação/projeto_final/conceito/ideias.pptx
@@ -8,7 +8,8 @@
     <p:sldId id="256" r:id="rId2"/>
     <p:sldId id="257" r:id="rId3"/>
     <p:sldId id="259" r:id="rId4"/>
-    <p:sldId id="258" r:id="rId5"/>
+    <p:sldId id="260" r:id="rId5"/>
+    <p:sldId id="258" r:id="rId6"/>
   </p:sldIdLst>
   <p:sldSz cx="12192000" cy="6858000"/>
   <p:notesSz cx="6858000" cy="9144000"/>
@@ -262,7 +263,7 @@
           <a:p>
             <a:fld id="{54651E13-7962-4397-B7F0-3230B14D01EC}" type="datetimeFigureOut">
               <a:rPr lang="pt-BR" smtClean="0"/>
-              <a:t>15/01/2024</a:t>
+              <a:t>21/01/2024</a:t>
             </a:fld>
             <a:endParaRPr lang="pt-BR"/>
           </a:p>
@@ -460,7 +461,7 @@
           <a:p>
             <a:fld id="{54651E13-7962-4397-B7F0-3230B14D01EC}" type="datetimeFigureOut">
               <a:rPr lang="pt-BR" smtClean="0"/>
-              <a:t>15/01/2024</a:t>
+              <a:t>21/01/2024</a:t>
             </a:fld>
             <a:endParaRPr lang="pt-BR"/>
           </a:p>
@@ -668,7 +669,7 @@
           <a:p>
             <a:fld id="{54651E13-7962-4397-B7F0-3230B14D01EC}" type="datetimeFigureOut">
               <a:rPr lang="pt-BR" smtClean="0"/>
-              <a:t>15/01/2024</a:t>
+              <a:t>21/01/2024</a:t>
             </a:fld>
             <a:endParaRPr lang="pt-BR"/>
           </a:p>
@@ -866,7 +867,7 @@
           <a:p>
             <a:fld id="{54651E13-7962-4397-B7F0-3230B14D01EC}" type="datetimeFigureOut">
               <a:rPr lang="pt-BR" smtClean="0"/>
-              <a:t>15/01/2024</a:t>
+              <a:t>21/01/2024</a:t>
             </a:fld>
             <a:endParaRPr lang="pt-BR"/>
           </a:p>
@@ -1141,7 +1142,7 @@
           <a:p>
             <a:fld id="{54651E13-7962-4397-B7F0-3230B14D01EC}" type="datetimeFigureOut">
               <a:rPr lang="pt-BR" smtClean="0"/>
-              <a:t>15/01/2024</a:t>
+              <a:t>21/01/2024</a:t>
             </a:fld>
             <a:endParaRPr lang="pt-BR"/>
           </a:p>
@@ -1406,7 +1407,7 @@
           <a:p>
             <a:fld id="{54651E13-7962-4397-B7F0-3230B14D01EC}" type="datetimeFigureOut">
               <a:rPr lang="pt-BR" smtClean="0"/>
-              <a:t>15/01/2024</a:t>
+              <a:t>21/01/2024</a:t>
             </a:fld>
             <a:endParaRPr lang="pt-BR"/>
           </a:p>
@@ -1818,7 +1819,7 @@
           <a:p>
             <a:fld id="{54651E13-7962-4397-B7F0-3230B14D01EC}" type="datetimeFigureOut">
               <a:rPr lang="pt-BR" smtClean="0"/>
-              <a:t>15/01/2024</a:t>
+              <a:t>21/01/2024</a:t>
             </a:fld>
             <a:endParaRPr lang="pt-BR"/>
           </a:p>
@@ -1959,7 +1960,7 @@
           <a:p>
             <a:fld id="{54651E13-7962-4397-B7F0-3230B14D01EC}" type="datetimeFigureOut">
               <a:rPr lang="pt-BR" smtClean="0"/>
-              <a:t>15/01/2024</a:t>
+              <a:t>21/01/2024</a:t>
             </a:fld>
             <a:endParaRPr lang="pt-BR"/>
           </a:p>
@@ -2072,7 +2073,7 @@
           <a:p>
             <a:fld id="{54651E13-7962-4397-B7F0-3230B14D01EC}" type="datetimeFigureOut">
               <a:rPr lang="pt-BR" smtClean="0"/>
-              <a:t>15/01/2024</a:t>
+              <a:t>21/01/2024</a:t>
             </a:fld>
             <a:endParaRPr lang="pt-BR"/>
           </a:p>
@@ -2383,7 +2384,7 @@
           <a:p>
             <a:fld id="{54651E13-7962-4397-B7F0-3230B14D01EC}" type="datetimeFigureOut">
               <a:rPr lang="pt-BR" smtClean="0"/>
-              <a:t>15/01/2024</a:t>
+              <a:t>21/01/2024</a:t>
             </a:fld>
             <a:endParaRPr lang="pt-BR"/>
           </a:p>
@@ -2671,7 +2672,7 @@
           <a:p>
             <a:fld id="{54651E13-7962-4397-B7F0-3230B14D01EC}" type="datetimeFigureOut">
               <a:rPr lang="pt-BR" smtClean="0"/>
-              <a:t>15/01/2024</a:t>
+              <a:t>21/01/2024</a:t>
             </a:fld>
             <a:endParaRPr lang="pt-BR"/>
           </a:p>
@@ -2912,7 +2913,7 @@
           <a:p>
             <a:fld id="{54651E13-7962-4397-B7F0-3230B14D01EC}" type="datetimeFigureOut">
               <a:rPr lang="pt-BR" smtClean="0"/>
-              <a:t>15/01/2024</a:t>
+              <a:t>21/01/2024</a:t>
             </a:fld>
             <a:endParaRPr lang="pt-BR"/>
           </a:p>
@@ -3453,60 +3454,6 @@
           </a:extLst>
         </p:spPr>
       </p:pic>
-      <p:sp>
-        <p:nvSpPr>
-          <p:cNvPr id="2" name="Retângulo: Cantos Arredondados 1">
-            <a:extLst>
-              <a:ext uri="{FF2B5EF4-FFF2-40B4-BE49-F238E27FC236}">
-                <a16:creationId xmlns:a16="http://schemas.microsoft.com/office/drawing/2014/main" id="{A3D520E5-23BA-4DD2-345C-8BD3934DAFA0}"/>
-              </a:ext>
-            </a:extLst>
-          </p:cNvPr>
-          <p:cNvSpPr/>
-          <p:nvPr/>
-        </p:nvSpPr>
-        <p:spPr>
-          <a:xfrm>
-            <a:off x="1460499" y="1659467"/>
-            <a:ext cx="9342000" cy="4936066"/>
-          </a:xfrm>
-          <a:prstGeom prst="roundRect">
-            <a:avLst>
-              <a:gd name="adj" fmla="val 2773"/>
-            </a:avLst>
-          </a:prstGeom>
-          <a:solidFill>
-            <a:srgbClr val="1EB8C2"/>
-          </a:solidFill>
-          <a:ln>
-            <a:noFill/>
-          </a:ln>
-        </p:spPr>
-        <p:style>
-          <a:lnRef idx="2">
-            <a:schemeClr val="accent1">
-              <a:shade val="15000"/>
-            </a:schemeClr>
-          </a:lnRef>
-          <a:fillRef idx="1">
-            <a:schemeClr val="accent1"/>
-          </a:fillRef>
-          <a:effectRef idx="0">
-            <a:schemeClr val="accent1"/>
-          </a:effectRef>
-          <a:fontRef idx="minor">
-            <a:schemeClr val="lt1"/>
-          </a:fontRef>
-        </p:style>
-        <p:txBody>
-          <a:bodyPr rtlCol="0" anchor="ctr"/>
-          <a:lstStyle/>
-          <a:p>
-            <a:pPr algn="ctr"/>
-            <a:endParaRPr lang="pt-BR"/>
-          </a:p>
-        </p:txBody>
-      </p:sp>
       <p:pic>
         <p:nvPicPr>
           <p:cNvPr id="6" name="Imagem 5">
@@ -3576,6 +3523,548 @@
           </a:effectLst>
         </p:spPr>
       </p:pic>
+      <p:grpSp>
+        <p:nvGrpSpPr>
+          <p:cNvPr id="14" name="Background">
+            <a:extLst>
+              <a:ext uri="{FF2B5EF4-FFF2-40B4-BE49-F238E27FC236}">
+                <a16:creationId xmlns:a16="http://schemas.microsoft.com/office/drawing/2014/main" id="{CE398B3D-435B-AC0B-2921-8CC5A6A0AA16}"/>
+              </a:ext>
+            </a:extLst>
+          </p:cNvPr>
+          <p:cNvGrpSpPr/>
+          <p:nvPr/>
+        </p:nvGrpSpPr>
+        <p:grpSpPr>
+          <a:xfrm>
+            <a:off x="968748" y="1147501"/>
+            <a:ext cx="9342000" cy="5307068"/>
+            <a:chOff x="1460499" y="1295239"/>
+            <a:chExt cx="9342000" cy="5307068"/>
+          </a:xfrm>
+        </p:grpSpPr>
+        <p:sp>
+          <p:nvSpPr>
+            <p:cNvPr id="3" name="Retângulo 2">
+              <a:extLst>
+                <a:ext uri="{FF2B5EF4-FFF2-40B4-BE49-F238E27FC236}">
+                  <a16:creationId xmlns:a16="http://schemas.microsoft.com/office/drawing/2014/main" id="{2EEC7E4B-BACB-3B70-E61F-3E57D7E5DDAB}"/>
+                </a:ext>
+              </a:extLst>
+            </p:cNvPr>
+            <p:cNvSpPr/>
+            <p:nvPr/>
+          </p:nvSpPr>
+          <p:spPr>
+            <a:xfrm>
+              <a:off x="1460499" y="1304365"/>
+              <a:ext cx="9335650" cy="5297942"/>
+            </a:xfrm>
+            <a:prstGeom prst="rect">
+              <a:avLst/>
+            </a:prstGeom>
+            <a:solidFill>
+              <a:srgbClr val="424242"/>
+            </a:solidFill>
+            <a:ln>
+              <a:noFill/>
+            </a:ln>
+          </p:spPr>
+          <p:style>
+            <a:lnRef idx="2">
+              <a:schemeClr val="accent1">
+                <a:shade val="15000"/>
+              </a:schemeClr>
+            </a:lnRef>
+            <a:fillRef idx="1">
+              <a:schemeClr val="accent1"/>
+            </a:fillRef>
+            <a:effectRef idx="0">
+              <a:schemeClr val="accent1"/>
+            </a:effectRef>
+            <a:fontRef idx="minor">
+              <a:schemeClr val="lt1"/>
+            </a:fontRef>
+          </p:style>
+          <p:txBody>
+            <a:bodyPr rtlCol="0" anchor="ctr"/>
+            <a:lstStyle/>
+            <a:p>
+              <a:pPr algn="ctr"/>
+              <a:endParaRPr lang="pt-BR"/>
+            </a:p>
+          </p:txBody>
+        </p:sp>
+        <p:grpSp>
+          <p:nvGrpSpPr>
+            <p:cNvPr id="13" name="Agrupar 12">
+              <a:extLst>
+                <a:ext uri="{FF2B5EF4-FFF2-40B4-BE49-F238E27FC236}">
+                  <a16:creationId xmlns:a16="http://schemas.microsoft.com/office/drawing/2014/main" id="{2ECFE578-01C5-B8C5-BDB1-21E3C33A3762}"/>
+                </a:ext>
+              </a:extLst>
+            </p:cNvPr>
+            <p:cNvGrpSpPr/>
+            <p:nvPr/>
+          </p:nvGrpSpPr>
+          <p:grpSpPr>
+            <a:xfrm>
+              <a:off x="1460499" y="1295239"/>
+              <a:ext cx="9342000" cy="5307068"/>
+              <a:chOff x="1460499" y="1295239"/>
+              <a:chExt cx="9342000" cy="5307068"/>
+            </a:xfrm>
+          </p:grpSpPr>
+          <p:sp>
+            <p:nvSpPr>
+              <p:cNvPr id="2" name="Retângulo 1">
+                <a:extLst>
+                  <a:ext uri="{FF2B5EF4-FFF2-40B4-BE49-F238E27FC236}">
+                    <a16:creationId xmlns:a16="http://schemas.microsoft.com/office/drawing/2014/main" id="{A3D520E5-23BA-4DD2-345C-8BD3934DAFA0}"/>
+                  </a:ext>
+                </a:extLst>
+              </p:cNvPr>
+              <p:cNvSpPr/>
+              <p:nvPr/>
+            </p:nvSpPr>
+            <p:spPr>
+              <a:xfrm>
+                <a:off x="1460499" y="1659467"/>
+                <a:ext cx="9342000" cy="4942840"/>
+              </a:xfrm>
+              <a:prstGeom prst="rect">
+                <a:avLst/>
+              </a:prstGeom>
+              <a:solidFill>
+                <a:srgbClr val="1EB8C2"/>
+              </a:solidFill>
+              <a:ln>
+                <a:noFill/>
+              </a:ln>
+            </p:spPr>
+            <p:style>
+              <a:lnRef idx="2">
+                <a:schemeClr val="accent1">
+                  <a:shade val="15000"/>
+                </a:schemeClr>
+              </a:lnRef>
+              <a:fillRef idx="1">
+                <a:schemeClr val="accent1"/>
+              </a:fillRef>
+              <a:effectRef idx="0">
+                <a:schemeClr val="accent1"/>
+              </a:effectRef>
+              <a:fontRef idx="minor">
+                <a:schemeClr val="lt1"/>
+              </a:fontRef>
+            </p:style>
+            <p:txBody>
+              <a:bodyPr rtlCol="0" anchor="ctr"/>
+              <a:lstStyle/>
+              <a:p>
+                <a:pPr algn="ctr"/>
+                <a:endParaRPr lang="pt-BR"/>
+              </a:p>
+            </p:txBody>
+          </p:sp>
+          <p:pic>
+            <p:nvPicPr>
+              <p:cNvPr id="5" name="Imagem 4">
+                <a:extLst>
+                  <a:ext uri="{FF2B5EF4-FFF2-40B4-BE49-F238E27FC236}">
+                    <a16:creationId xmlns:a16="http://schemas.microsoft.com/office/drawing/2014/main" id="{7A32653E-C9BF-C338-7D02-792BD934D5AC}"/>
+                  </a:ext>
+                </a:extLst>
+              </p:cNvPr>
+              <p:cNvPicPr>
+                <a:picLocks noChangeAspect="1"/>
+              </p:cNvPicPr>
+              <p:nvPr/>
+            </p:nvPicPr>
+            <p:blipFill rotWithShape="1">
+              <a:blip r:embed="rId3"/>
+              <a:srcRect t="34158"/>
+              <a:stretch/>
+            </p:blipFill>
+            <p:spPr>
+              <a:xfrm>
+                <a:off x="1460499" y="1645919"/>
+                <a:ext cx="9342000" cy="1564636"/>
+              </a:xfrm>
+              <a:prstGeom prst="rect">
+                <a:avLst/>
+              </a:prstGeom>
+            </p:spPr>
+          </p:pic>
+          <p:grpSp>
+            <p:nvGrpSpPr>
+              <p:cNvPr id="11" name="Agrupar 10">
+                <a:extLst>
+                  <a:ext uri="{FF2B5EF4-FFF2-40B4-BE49-F238E27FC236}">
+                    <a16:creationId xmlns:a16="http://schemas.microsoft.com/office/drawing/2014/main" id="{7D8B2A00-2907-1CD3-4FD5-2E93E155CBE0}"/>
+                  </a:ext>
+                </a:extLst>
+              </p:cNvPr>
+              <p:cNvGrpSpPr/>
+              <p:nvPr/>
+            </p:nvGrpSpPr>
+            <p:grpSpPr>
+              <a:xfrm>
+                <a:off x="1573103" y="1371645"/>
+                <a:ext cx="212834" cy="216520"/>
+                <a:chOff x="134089" y="4253753"/>
+                <a:chExt cx="914400" cy="930231"/>
+              </a:xfrm>
+            </p:grpSpPr>
+            <p:sp>
+              <p:nvSpPr>
+                <p:cNvPr id="9" name="Elipse 8">
+                  <a:extLst>
+                    <a:ext uri="{FF2B5EF4-FFF2-40B4-BE49-F238E27FC236}">
+                      <a16:creationId xmlns:a16="http://schemas.microsoft.com/office/drawing/2014/main" id="{1E1F372E-7FF4-1809-20F1-16EAB21666A8}"/>
+                    </a:ext>
+                  </a:extLst>
+                </p:cNvPr>
+                <p:cNvSpPr/>
+                <p:nvPr/>
+              </p:nvSpPr>
+              <p:spPr>
+                <a:xfrm>
+                  <a:off x="134089" y="4253753"/>
+                  <a:ext cx="914400" cy="914400"/>
+                </a:xfrm>
+                <a:prstGeom prst="ellipse">
+                  <a:avLst/>
+                </a:prstGeom>
+                <a:solidFill>
+                  <a:srgbClr val="F7C400"/>
+                </a:solidFill>
+                <a:ln>
+                  <a:noFill/>
+                </a:ln>
+              </p:spPr>
+              <p:style>
+                <a:lnRef idx="2">
+                  <a:schemeClr val="accent1">
+                    <a:shade val="15000"/>
+                  </a:schemeClr>
+                </a:lnRef>
+                <a:fillRef idx="1">
+                  <a:schemeClr val="accent1"/>
+                </a:fillRef>
+                <a:effectRef idx="0">
+                  <a:schemeClr val="accent1"/>
+                </a:effectRef>
+                <a:fontRef idx="minor">
+                  <a:schemeClr val="lt1"/>
+                </a:fontRef>
+              </p:style>
+              <p:txBody>
+                <a:bodyPr rtlCol="0" anchor="ctr"/>
+                <a:lstStyle/>
+                <a:p>
+                  <a:pPr algn="ctr"/>
+                  <a:endParaRPr lang="pt-BR"/>
+                </a:p>
+              </p:txBody>
+            </p:sp>
+            <p:pic>
+              <p:nvPicPr>
+                <p:cNvPr id="8" name="Gráfico 7" descr="Avião estrutura de tópicos">
+                  <a:extLst>
+                    <a:ext uri="{FF2B5EF4-FFF2-40B4-BE49-F238E27FC236}">
+                      <a16:creationId xmlns:a16="http://schemas.microsoft.com/office/drawing/2014/main" id="{8CD92B5A-B6BE-A97C-8159-A46C5D9739AD}"/>
+                    </a:ext>
+                  </a:extLst>
+                </p:cNvPr>
+                <p:cNvPicPr>
+                  <a:picLocks noChangeAspect="1"/>
+                </p:cNvPicPr>
+                <p:nvPr/>
+              </p:nvPicPr>
+              <p:blipFill>
+                <a:blip r:embed="rId5">
+                  <a:extLst>
+                    <a:ext uri="{28A0092B-C50C-407E-A947-70E740481C1C}">
+                      <a14:useLocalDpi xmlns:a14="http://schemas.microsoft.com/office/drawing/2010/main" val="0"/>
+                    </a:ext>
+                    <a:ext uri="{96DAC541-7B7A-43D3-8B79-37D633B846F1}">
+                      <asvg:svgBlip xmlns:asvg="http://schemas.microsoft.com/office/drawing/2016/SVG/main" r:embed="rId6"/>
+                    </a:ext>
+                  </a:extLst>
+                </a:blip>
+                <a:stretch>
+                  <a:fillRect/>
+                </a:stretch>
+              </p:blipFill>
+              <p:spPr>
+                <a:xfrm>
+                  <a:off x="257354" y="4267200"/>
+                  <a:ext cx="667871" cy="667871"/>
+                </a:xfrm>
+                <a:prstGeom prst="rect">
+                  <a:avLst/>
+                </a:prstGeom>
+              </p:spPr>
+            </p:pic>
+            <p:sp>
+              <p:nvSpPr>
+                <p:cNvPr id="10" name="Triângulo isósceles 9">
+                  <a:extLst>
+                    <a:ext uri="{FF2B5EF4-FFF2-40B4-BE49-F238E27FC236}">
+                      <a16:creationId xmlns:a16="http://schemas.microsoft.com/office/drawing/2014/main" id="{A5765E87-43F0-751D-7A57-4896B513A179}"/>
+                    </a:ext>
+                  </a:extLst>
+                </p:cNvPr>
+                <p:cNvSpPr/>
+                <p:nvPr/>
+              </p:nvSpPr>
+              <p:spPr>
+                <a:xfrm>
+                  <a:off x="452635" y="4856820"/>
+                  <a:ext cx="277308" cy="327164"/>
+                </a:xfrm>
+                <a:prstGeom prst="triangle">
+                  <a:avLst/>
+                </a:prstGeom>
+                <a:solidFill>
+                  <a:srgbClr val="424242"/>
+                </a:solidFill>
+                <a:ln>
+                  <a:noFill/>
+                </a:ln>
+              </p:spPr>
+              <p:style>
+                <a:lnRef idx="2">
+                  <a:schemeClr val="accent1">
+                    <a:shade val="15000"/>
+                  </a:schemeClr>
+                </a:lnRef>
+                <a:fillRef idx="1">
+                  <a:schemeClr val="accent1"/>
+                </a:fillRef>
+                <a:effectRef idx="0">
+                  <a:schemeClr val="accent1"/>
+                </a:effectRef>
+                <a:fontRef idx="minor">
+                  <a:schemeClr val="lt1"/>
+                </a:fontRef>
+              </p:style>
+              <p:txBody>
+                <a:bodyPr rtlCol="0" anchor="ctr"/>
+                <a:lstStyle/>
+                <a:p>
+                  <a:pPr algn="ctr"/>
+                  <a:endParaRPr lang="pt-BR"/>
+                </a:p>
+              </p:txBody>
+            </p:sp>
+          </p:grpSp>
+          <p:sp>
+            <p:nvSpPr>
+              <p:cNvPr id="12" name="CaixaDeTexto 11">
+                <a:extLst>
+                  <a:ext uri="{FF2B5EF4-FFF2-40B4-BE49-F238E27FC236}">
+                    <a16:creationId xmlns:a16="http://schemas.microsoft.com/office/drawing/2014/main" id="{284653D2-FAA1-63A2-9927-EF908D24EBA4}"/>
+                  </a:ext>
+                </a:extLst>
+              </p:cNvPr>
+              <p:cNvSpPr txBox="1"/>
+              <p:nvPr/>
+            </p:nvSpPr>
+            <p:spPr>
+              <a:xfrm>
+                <a:off x="1811783" y="1295239"/>
+                <a:ext cx="783291" cy="369332"/>
+              </a:xfrm>
+              <a:prstGeom prst="rect">
+                <a:avLst/>
+              </a:prstGeom>
+              <a:noFill/>
+            </p:spPr>
+            <p:txBody>
+              <a:bodyPr wrap="none" rtlCol="0">
+                <a:spAutoFit/>
+              </a:bodyPr>
+              <a:lstStyle/>
+              <a:p>
+                <a:r>
+                  <a:rPr lang="pt-BR" dirty="0">
+                    <a:solidFill>
+                      <a:schemeClr val="bg1"/>
+                    </a:solidFill>
+                  </a:rPr>
+                  <a:t>Hotéis</a:t>
+                </a:r>
+              </a:p>
+            </p:txBody>
+          </p:sp>
+        </p:grpSp>
+      </p:grpSp>
+      <p:grpSp>
+        <p:nvGrpSpPr>
+          <p:cNvPr id="18" name="Agrupar 17">
+            <a:extLst>
+              <a:ext uri="{FF2B5EF4-FFF2-40B4-BE49-F238E27FC236}">
+                <a16:creationId xmlns:a16="http://schemas.microsoft.com/office/drawing/2014/main" id="{C5DC8EA7-2FFC-77C7-8DF6-3283B22848F9}"/>
+              </a:ext>
+            </a:extLst>
+          </p:cNvPr>
+          <p:cNvGrpSpPr/>
+          <p:nvPr/>
+        </p:nvGrpSpPr>
+        <p:grpSpPr>
+          <a:xfrm>
+            <a:off x="302684" y="1147757"/>
+            <a:ext cx="212834" cy="216520"/>
+            <a:chOff x="1233752" y="1376307"/>
+            <a:chExt cx="212834" cy="216520"/>
+          </a:xfrm>
+        </p:grpSpPr>
+        <p:sp>
+          <p:nvSpPr>
+            <p:cNvPr id="15" name="Elipse 14">
+              <a:extLst>
+                <a:ext uri="{FF2B5EF4-FFF2-40B4-BE49-F238E27FC236}">
+                  <a16:creationId xmlns:a16="http://schemas.microsoft.com/office/drawing/2014/main" id="{1C61CD90-7D31-1680-FDCC-725B84C802D8}"/>
+                </a:ext>
+              </a:extLst>
+            </p:cNvPr>
+            <p:cNvSpPr/>
+            <p:nvPr/>
+          </p:nvSpPr>
+          <p:spPr>
+            <a:xfrm>
+              <a:off x="1233752" y="1376307"/>
+              <a:ext cx="212834" cy="212835"/>
+            </a:xfrm>
+            <a:prstGeom prst="ellipse">
+              <a:avLst/>
+            </a:prstGeom>
+            <a:solidFill>
+              <a:srgbClr val="F7C400"/>
+            </a:solidFill>
+            <a:ln>
+              <a:noFill/>
+            </a:ln>
+          </p:spPr>
+          <p:style>
+            <a:lnRef idx="2">
+              <a:schemeClr val="accent1">
+                <a:shade val="15000"/>
+              </a:schemeClr>
+            </a:lnRef>
+            <a:fillRef idx="1">
+              <a:schemeClr val="accent1"/>
+            </a:fillRef>
+            <a:effectRef idx="0">
+              <a:schemeClr val="accent1"/>
+            </a:effectRef>
+            <a:fontRef idx="minor">
+              <a:schemeClr val="lt1"/>
+            </a:fontRef>
+          </p:style>
+          <p:txBody>
+            <a:bodyPr rtlCol="0" anchor="ctr"/>
+            <a:lstStyle/>
+            <a:p>
+              <a:pPr algn="ctr"/>
+              <a:endParaRPr lang="pt-BR"/>
+            </a:p>
+          </p:txBody>
+        </p:sp>
+        <p:pic>
+          <p:nvPicPr>
+            <p:cNvPr id="16" name="Gráfico 15" descr="Avião estrutura de tópicos">
+              <a:extLst>
+                <a:ext uri="{FF2B5EF4-FFF2-40B4-BE49-F238E27FC236}">
+                  <a16:creationId xmlns:a16="http://schemas.microsoft.com/office/drawing/2014/main" id="{A2294844-0676-D51D-2FD3-A4683693171D}"/>
+                </a:ext>
+              </a:extLst>
+            </p:cNvPr>
+            <p:cNvPicPr>
+              <a:picLocks noChangeAspect="1"/>
+            </p:cNvPicPr>
+            <p:nvPr/>
+          </p:nvPicPr>
+          <p:blipFill>
+            <a:blip r:embed="rId5">
+              <a:extLst>
+                <a:ext uri="{28A0092B-C50C-407E-A947-70E740481C1C}">
+                  <a14:useLocalDpi xmlns:a14="http://schemas.microsoft.com/office/drawing/2010/main" val="0"/>
+                </a:ext>
+                <a:ext uri="{96DAC541-7B7A-43D3-8B79-37D633B846F1}">
+                  <asvg:svgBlip xmlns:asvg="http://schemas.microsoft.com/office/drawing/2016/SVG/main" r:embed="rId6"/>
+                </a:ext>
+              </a:extLst>
+            </a:blip>
+            <a:stretch>
+              <a:fillRect/>
+            </a:stretch>
+          </p:blipFill>
+          <p:spPr>
+            <a:xfrm>
+              <a:off x="1262443" y="1379437"/>
+              <a:ext cx="155452" cy="155453"/>
+            </a:xfrm>
+            <a:prstGeom prst="rect">
+              <a:avLst/>
+            </a:prstGeom>
+          </p:spPr>
+        </p:pic>
+        <p:sp>
+          <p:nvSpPr>
+            <p:cNvPr id="17" name="Triângulo isósceles 16">
+              <a:extLst>
+                <a:ext uri="{FF2B5EF4-FFF2-40B4-BE49-F238E27FC236}">
+                  <a16:creationId xmlns:a16="http://schemas.microsoft.com/office/drawing/2014/main" id="{6BA3A180-7A2A-F5BB-44D8-AE052DFC250B}"/>
+                </a:ext>
+              </a:extLst>
+            </p:cNvPr>
+            <p:cNvSpPr/>
+            <p:nvPr/>
+          </p:nvSpPr>
+          <p:spPr>
+            <a:xfrm>
+              <a:off x="1307896" y="1516677"/>
+              <a:ext cx="64546" cy="76150"/>
+            </a:xfrm>
+            <a:prstGeom prst="triangle">
+              <a:avLst/>
+            </a:prstGeom>
+            <a:solidFill>
+              <a:srgbClr val="424242"/>
+            </a:solidFill>
+            <a:ln>
+              <a:noFill/>
+            </a:ln>
+          </p:spPr>
+          <p:style>
+            <a:lnRef idx="2">
+              <a:schemeClr val="accent1">
+                <a:shade val="15000"/>
+              </a:schemeClr>
+            </a:lnRef>
+            <a:fillRef idx="1">
+              <a:schemeClr val="accent1"/>
+            </a:fillRef>
+            <a:effectRef idx="0">
+              <a:schemeClr val="accent1"/>
+            </a:effectRef>
+            <a:fontRef idx="minor">
+              <a:schemeClr val="lt1"/>
+            </a:fontRef>
+          </p:style>
+          <p:txBody>
+            <a:bodyPr rtlCol="0" anchor="ctr"/>
+            <a:lstStyle/>
+            <a:p>
+              <a:pPr algn="ctr"/>
+              <a:endParaRPr lang="pt-BR"/>
+            </a:p>
+          </p:txBody>
+        </p:sp>
+      </p:grpSp>
     </p:spTree>
     <p:extLst>
       <p:ext uri="{BB962C8B-B14F-4D97-AF65-F5344CB8AC3E}">
@@ -3818,6 +4307,72 @@
 </file>
 
 <file path=ppt/slides/slide4.xml><?xml version="1.0" encoding="utf-8"?>
+<p:sld xmlns:a="http://schemas.openxmlformats.org/drawingml/2006/main" xmlns:r="http://schemas.openxmlformats.org/officeDocument/2006/relationships" xmlns:p="http://schemas.openxmlformats.org/presentationml/2006/main">
+  <p:cSld>
+    <p:spTree>
+      <p:nvGrpSpPr>
+        <p:cNvPr id="1" name=""/>
+        <p:cNvGrpSpPr/>
+        <p:nvPr/>
+      </p:nvGrpSpPr>
+      <p:grpSpPr>
+        <a:xfrm>
+          <a:off x="0" y="0"/>
+          <a:ext cx="0" cy="0"/>
+          <a:chOff x="0" y="0"/>
+          <a:chExt cx="0" cy="0"/>
+        </a:xfrm>
+      </p:grpSpPr>
+      <p:pic>
+        <p:nvPicPr>
+          <p:cNvPr id="6" name="Imagem 5" descr="Interface gráfica do usuário, Site&#10;&#10;Descrição gerada automaticamente">
+            <a:extLst>
+              <a:ext uri="{FF2B5EF4-FFF2-40B4-BE49-F238E27FC236}">
+                <a16:creationId xmlns:a16="http://schemas.microsoft.com/office/drawing/2014/main" id="{D2AB860E-E821-41FB-5168-F1205650D3C0}"/>
+              </a:ext>
+            </a:extLst>
+          </p:cNvPr>
+          <p:cNvPicPr>
+            <a:picLocks noChangeAspect="1"/>
+          </p:cNvPicPr>
+          <p:nvPr/>
+        </p:nvPicPr>
+        <p:blipFill>
+          <a:blip r:embed="rId2">
+            <a:extLst>
+              <a:ext uri="{28A0092B-C50C-407E-A947-70E740481C1C}">
+                <a14:useLocalDpi xmlns:a14="http://schemas.microsoft.com/office/drawing/2010/main" val="0"/>
+              </a:ext>
+            </a:extLst>
+          </a:blip>
+          <a:stretch>
+            <a:fillRect/>
+          </a:stretch>
+        </p:blipFill>
+        <p:spPr>
+          <a:xfrm>
+            <a:off x="0" y="0"/>
+            <a:ext cx="12192000" cy="6858000"/>
+          </a:xfrm>
+          <a:prstGeom prst="rect">
+            <a:avLst/>
+          </a:prstGeom>
+        </p:spPr>
+      </p:pic>
+    </p:spTree>
+    <p:extLst>
+      <p:ext uri="{BB962C8B-B14F-4D97-AF65-F5344CB8AC3E}">
+        <p14:creationId xmlns:p14="http://schemas.microsoft.com/office/powerpoint/2010/main" val="2253097635"/>
+      </p:ext>
+    </p:extLst>
+  </p:cSld>
+  <p:clrMapOvr>
+    <a:masterClrMapping/>
+  </p:clrMapOvr>
+</p:sld>
+</file>
+
+<file path=ppt/slides/slide5.xml><?xml version="1.0" encoding="utf-8"?>
 <p:sld xmlns:a="http://schemas.openxmlformats.org/drawingml/2006/main" xmlns:r="http://schemas.openxmlformats.org/officeDocument/2006/relationships" xmlns:p="http://schemas.openxmlformats.org/presentationml/2006/main">
   <p:cSld>
     <p:spTree>

</xml_diff>